<commit_message>
Updated final project artifacts to turn in.
</commit_message>
<xml_diff>
--- a/project/final-presentation.pptx
+++ b/project/final-presentation.pptx
@@ -24,7 +24,7 @@
     <p:sldId id="264" r:id="rId15"/>
   </p:sldIdLst>
   <p:sldSz cx="9144000" cy="6858000" type="screen4x3"/>
-  <p:notesSz cx="6858000" cy="9144000"/>
+  <p:notesSz cx="6858000" cy="9239250"/>
   <p:defaultTextStyle>
     <a:defPPr>
       <a:defRPr lang="en-US"/>
@@ -163,7 +163,7 @@
         <p:spPr>
           <a:xfrm>
             <a:off x="0" y="0"/>
-            <a:ext cx="2971800" cy="458788"/>
+            <a:ext cx="2971800" cy="463567"/>
           </a:xfrm>
           <a:prstGeom prst="rect">
             <a:avLst/>
@@ -194,7 +194,7 @@
         <p:spPr>
           <a:xfrm>
             <a:off x="3884613" y="0"/>
-            <a:ext cx="2971800" cy="458788"/>
+            <a:ext cx="2971800" cy="463567"/>
           </a:xfrm>
           <a:prstGeom prst="rect">
             <a:avLst/>
@@ -210,7 +210,7 @@
           <a:p>
             <a:fld id="{20114702-D54D-314B-A2C4-B1869AA6BC1B}" type="datetimeFigureOut">
               <a:rPr lang="en-US" smtClean="0"/>
-              <a:t>10/10/2024</a:t>
+              <a:t>10/11/2024</a:t>
             </a:fld>
             <a:endParaRPr lang="en-US"/>
           </a:p>
@@ -228,8 +228,8 @@
         </p:nvSpPr>
         <p:spPr>
           <a:xfrm>
-            <a:off x="1371600" y="1143000"/>
-            <a:ext cx="4114800" cy="3086100"/>
+            <a:off x="1349375" y="1154113"/>
+            <a:ext cx="4159250" cy="3119437"/>
           </a:xfrm>
           <a:prstGeom prst="rect">
             <a:avLst/>
@@ -261,8 +261,8 @@
         </p:nvSpPr>
         <p:spPr>
           <a:xfrm>
-            <a:off x="685800" y="4400550"/>
-            <a:ext cx="5486400" cy="3600450"/>
+            <a:off x="685800" y="4446389"/>
+            <a:ext cx="5486400" cy="3637955"/>
           </a:xfrm>
           <a:prstGeom prst="rect">
             <a:avLst/>
@@ -320,8 +320,8 @@
         </p:nvSpPr>
         <p:spPr>
           <a:xfrm>
-            <a:off x="0" y="8685213"/>
-            <a:ext cx="2971800" cy="458787"/>
+            <a:off x="0" y="8775684"/>
+            <a:ext cx="2971800" cy="463566"/>
           </a:xfrm>
           <a:prstGeom prst="rect">
             <a:avLst/>
@@ -351,8 +351,8 @@
         </p:nvSpPr>
         <p:spPr>
           <a:xfrm>
-            <a:off x="3884613" y="8685213"/>
-            <a:ext cx="2971800" cy="458787"/>
+            <a:off x="3884613" y="8775684"/>
+            <a:ext cx="2971800" cy="463566"/>
           </a:xfrm>
           <a:prstGeom prst="rect">
             <a:avLst/>
@@ -523,23 +523,7 @@
           <a:p>
             <a:r>
               <a:rPr lang="en-US" dirty="0"/>
-              <a:t>Hello. My name is Farooq Mahmud and I this is my project presentation for the class Deep Learning for Data Science. I'll be presenting the results of my deep learning project where I reproduced the </a:t>
-            </a:r>
-            <a:r>
-              <a:rPr lang="en-US" dirty="0" err="1"/>
-              <a:t>GoogLeNet</a:t>
-            </a:r>
-            <a:r>
-              <a:rPr lang="en-US" dirty="0"/>
-              <a:t> model, which was introduced by </a:t>
-            </a:r>
-            <a:r>
-              <a:rPr lang="en-US" dirty="0" err="1"/>
-              <a:t>Szegedy</a:t>
-            </a:r>
-            <a:r>
-              <a:rPr lang="en-US" dirty="0"/>
-              <a:t> et al. in their 2015 paper, </a:t>
+              <a:t>Hello. My name is Farooq Mahmud and I this is my project presentation for the class Deep Learning for Data Science. I'll be presenting the results of my deep learning project where I reproduced the GoogLeNet model, which was introduced by Szegedy et al. in their 2015 paper, </a:t>
             </a:r>
             <a:r>
               <a:rPr lang="en-US" i="1" dirty="0"/>
@@ -568,15 +552,7 @@
             </a:r>
             <a:r>
               <a:rPr lang="en-US" i="0" dirty="0"/>
-              <a:t>as the “</a:t>
-            </a:r>
-            <a:r>
-              <a:rPr lang="en-US" i="0" dirty="0" err="1"/>
-              <a:t>Szegedy</a:t>
-            </a:r>
-            <a:r>
-              <a:rPr lang="en-US" i="0" dirty="0"/>
-              <a:t> paper.”</a:t>
+              <a:t>as the “Szegedy paper.”</a:t>
             </a:r>
             <a:endParaRPr lang="en-US" dirty="0"/>
           </a:p>
@@ -664,15 +640,7 @@
           <a:p>
             <a:r>
               <a:rPr lang="en-US" dirty="0"/>
-              <a:t>Since the publication of the </a:t>
-            </a:r>
-            <a:r>
-              <a:rPr lang="en-US" dirty="0" err="1"/>
-              <a:t>Szegedy</a:t>
-            </a:r>
-            <a:r>
-              <a:rPr lang="en-US" dirty="0"/>
-              <a:t> paper, many innovations have been made, like </a:t>
+              <a:t>Since the publication of the Szegedy paper, many innovations have been made, like </a:t>
             </a:r>
             <a:r>
               <a:rPr lang="en-US" dirty="0" err="1"/>
@@ -680,7 +648,16 @@
             </a:r>
             <a:r>
               <a:rPr lang="en-US" dirty="0"/>
-              <a:t>, which are optimized for mobile and resource-constrained environments. The Inception model influenced this and other systems. This project gave our me valuable hands-on experience in writing TensorFlow code for a complex CNN architecture. In the future, I could improve performance by using a larger dataset. I would also explore making the network implementation more dynamic so that it can process both ImageNet and CIFAR-10 images with around the same level of accuracy.</a:t>
+              <a:t>, which are optimized for mobile and resource-constrained environments. The fact that you can do image recognition tasks on mobile devices is possible in part because of this work.. This project gave our me valuable hands-on experience in writing TensorFlow code for a complex CNN architecture. In the future, I could improve performance by using a larger dataset. I would also explore making the network implementation more dynamic so that it can process both ImageNet and CIFAR-10 images with around the same level of accuracy.</a:t>
+            </a:r>
+          </a:p>
+          <a:p>
+            <a:endParaRPr lang="en-US" dirty="0"/>
+          </a:p>
+          <a:p>
+            <a:r>
+              <a:rPr lang="en-US" dirty="0"/>
+              <a:t>This class, although short, helped me understand neural network fundamentals. They are definitely less intimidating now that I’ve gone through the class. I am eager to continue expanding on this project at UWF and in my professional career.</a:t>
             </a:r>
           </a:p>
           <a:p>
@@ -776,23 +753,7 @@
           <a:p>
             <a:r>
               <a:rPr lang="en-US" dirty="0"/>
-              <a:t>In the field of computer vision, CNNs have made significant strides, especially in image classification. The Inception architecture, introduced in the </a:t>
-            </a:r>
-            <a:r>
-              <a:rPr lang="en-US" dirty="0" err="1"/>
-              <a:t>Szegedy</a:t>
-            </a:r>
-            <a:r>
-              <a:rPr lang="en-US" dirty="0"/>
-              <a:t> paper, was particularly innovative because it managed to balance computational efficiency with increased depth, helping it win the 2014 ImageNet challenge. Our project was motivated by a desire to reproduce </a:t>
-            </a:r>
-            <a:r>
-              <a:rPr lang="en-US" dirty="0" err="1"/>
-              <a:t>GoogLeNet</a:t>
-            </a:r>
-            <a:r>
-              <a:rPr lang="en-US" dirty="0"/>
-              <a:t>, using TensorFlow, and test its performance on both ImageNet and the CIFAR-10 dataset.</a:t>
+              <a:t>In the field of computer vision, CNNs have made significant strides, especially in image classification. The Inception architecture, introduced in the Szegedy paper, was particularly innovative because it managed to balance computational efficiency with increased depth, helping it win the 2014 ImageNet challenge. My project was motivated by a desire to reproduce GoogLeNet, using TensorFlow, and test its performance on both ImageNet and the CIFAR-10 dataset.</a:t>
             </a:r>
           </a:p>
         </p:txBody>
@@ -879,15 +840,7 @@
           <a:p>
             <a:r>
               <a:rPr lang="en-US" dirty="0"/>
-              <a:t>ImageNet is a large-scale dataset with over 1 million images and 1,000 classes, widely used for training CNNs. However, due to computational constraints, I used a subset of 14,738 images mapped to the 10 classes found in the CIFAR-10 dataset. These images were downscaled to 224x224 pixels, the same size </a:t>
-            </a:r>
-            <a:r>
-              <a:rPr lang="en-US" dirty="0" err="1"/>
-              <a:t>Szegedy</a:t>
-            </a:r>
-            <a:r>
-              <a:rPr lang="en-US" dirty="0"/>
-              <a:t> used. CIFAR-10, on the other hand, consists of 60,000 images in 10 classes, but at much lower resolutions of 32x32 pixels. For consistency, I upscaled the CIFAR-10 images to 224x224 during training.</a:t>
+              <a:t>ImageNet is a large-scale dataset with over 1 million images and 1,000 classes, widely used for training CNNs. However, due to computational constraints, I used a subset of 14,738 images mapped to the 10 classes found in the CIFAR-10 dataset. These images were downscaled to 224x224 pixels, the same size Szegedy used. CIFAR-10, on the other hand, consists of 60,000 images in 10 classes, but at much lower resolutions of 32x32 pixels. For consistency, I upscaled the CIFAR-10 images to 224x224 during training.</a:t>
             </a:r>
           </a:p>
         </p:txBody>
@@ -1090,15 +1043,7 @@
           <a:p>
             <a:r>
               <a:rPr lang="en-US" dirty="0"/>
-              <a:t>This approach enables the network to learn more complex spatial hierarchies from the input image compared to traditional sequential architectures, which only processed features one layer at a time. The key innovation of the Inception module lies in its use of 1x1 convolutions for dimensionality reduction before applying the larger 3x3 and 5x5 convolutions. This helps reduce the computational cost while maintaining high accuracy. After multiple Inception modules, we move to global average pooling, which reduces the feature maps to a single 1x1 output per feature map before the final fully connected layer for classification. This combination of deep and wide architecture allowed </a:t>
-            </a:r>
-            <a:r>
-              <a:rPr lang="en-US" dirty="0" err="1"/>
-              <a:t>GoogLeNet</a:t>
-            </a:r>
-            <a:r>
-              <a:rPr lang="en-US" dirty="0"/>
-              <a:t> to outperform previous models and win the 2014 ImageNet challenge.</a:t>
+              <a:t>This approach enables the network to learn more complex spatial hierarchies from the input image compared to traditional sequential architectures, which only processed features one layer at a time. The key innovation of the Inception module lies in its use of 1x1 convolutions for dimensionality reduction before applying the larger 3x3 and 5x5 convolutions. This helps reduce the computational cost while maintaining high accuracy. After multiple Inception modules, we move to global average pooling, which reduces the feature maps to a single 1x1 output per feature map before the final fully connected layer for classification. This combination of deep and wide architecture allowed GoogLeNet to outperform previous models and win the 2014 ImageNet challenge.</a:t>
             </a:r>
           </a:p>
         </p:txBody>
@@ -1280,23 +1225,7 @@
           <a:p>
             <a:r>
               <a:rPr lang="en-US" dirty="0"/>
-              <a:t>Before diving into the complexity of the </a:t>
-            </a:r>
-            <a:r>
-              <a:rPr lang="en-US" dirty="0" err="1"/>
-              <a:t>GoogLeNet</a:t>
-            </a:r>
-            <a:r>
-              <a:rPr lang="en-US" dirty="0"/>
-              <a:t> architecture, we implemented a simple sequential model as a baseline. Sequential models are straightforward—layers are stacked one after another without any branching. Our model started with several convolutional layers, followed by max-pooling layers to reduce dimensionality, and ended with fully connected layers for classification. This is a traditional architecture that was popular before the introduction of more advanced modules like Inception. We used this model to serve as a comparison point for the more complex </a:t>
-            </a:r>
-            <a:r>
-              <a:rPr lang="en-US" dirty="0" err="1"/>
-              <a:t>GoogLeNet</a:t>
-            </a:r>
-            <a:r>
-              <a:rPr lang="en-US" dirty="0"/>
-              <a:t> structure. While effective, the sequential model is limited in its ability to capture multi-scale features compared to </a:t>
+              <a:t>Before diving into the complexity of the GoogLeNet architecture, we implemented a simple sequential model as a baseline. Sequential models are straightforward—layers are stacked one after another without any branching. Our model started with several convolutional layers, followed by max-pooling layers to reduce dimensionality, and ended with fully connected layers for classification. This is a traditional architecture that was popular before the introduction of more advanced modules like Inception. We used this model to serve as a comparison point for the more complex GoogLeNet structure. While effective, the sequential model is limited in its ability to capture multi-scale features compared to </a:t>
             </a:r>
             <a:r>
               <a:rPr lang="en-US" dirty="0" err="1"/>
@@ -1503,23 +1432,7 @@
             </a:pPr>
             <a:r>
               <a:rPr lang="en-US" dirty="0"/>
-              <a:t>My replication of </a:t>
-            </a:r>
-            <a:r>
-              <a:rPr lang="en-US" dirty="0" err="1"/>
-              <a:t>GoogLeNet</a:t>
-            </a:r>
-            <a:r>
-              <a:rPr lang="en-US" dirty="0"/>
-              <a:t> produced some promising results. On a subset of ImageNet images, I achieved an accuracy of 66.2%, compared to 58.1% with a simpler model. However, on the CIFAR-10 dataset, the results were less impressive—22.6% for </a:t>
-            </a:r>
-            <a:r>
-              <a:rPr lang="en-US" dirty="0" err="1"/>
-              <a:t>GoogLeNet</a:t>
-            </a:r>
-            <a:r>
-              <a:rPr lang="en-US" dirty="0"/>
-              <a:t> compared to 21.4% for the simpler model. I think the smaller dataset size and the lower resolution of CIFAR-10 images caused the model to miss some important features. Additionally, my accuracy was lower than the original paper's, likely due to these constraints and the smaller scale of our experiment.</a:t>
+              <a:t>My replication of GoogLeNet produced some promising results. On a subset of ImageNet images, I achieved an accuracy of 66.2%, compared to 58.1% with a simpler model. However, on the CIFAR-10 dataset, the results were less impressive—22.6% for GoogLeNet compared to 21.4% for the simpler model. I think the smaller dataset size and the lower resolution of CIFAR-10 images caused the model to miss some important features. Additionally, my accuracy was lower than the original paper's, likely due to these constraints and the smaller scale of our experiment.</a:t>
             </a:r>
           </a:p>
           <a:p>
@@ -1562,15 +1475,7 @@
             </a:pPr>
             <a:r>
               <a:rPr lang="en-US" dirty="0"/>
-              <a:t>The </a:t>
-            </a:r>
-            <a:r>
-              <a:rPr lang="en-US" dirty="0" err="1"/>
-              <a:t>Szegedy</a:t>
-            </a:r>
-            <a:r>
-              <a:rPr lang="en-US" dirty="0"/>
-              <a:t> paper used the top-5 error rate as the accuracy metric. They achieved a top </a:t>
+              <a:t>The Szegedy paper used the top-5 error rate as the accuracy metric. They achieved a top </a:t>
             </a:r>
             <a:r>
               <a:rPr lang="en-US" b="0" dirty="0"/>
@@ -4341,15 +4246,7 @@
           <a:p>
             <a:r>
               <a:rPr lang="en-US" dirty="0"/>
-              <a:t>Reproducing </a:t>
-            </a:r>
-            <a:r>
-              <a:rPr lang="en-US" dirty="0" err="1"/>
-              <a:t>GoogLeNet</a:t>
-            </a:r>
-            <a:r>
-              <a:rPr lang="en-US" dirty="0"/>
-              <a:t> with TensorFlow</a:t>
+              <a:t>Reproducing GoogLeNet with TensorFlow</a:t>
             </a:r>
           </a:p>
         </p:txBody>
@@ -4451,7 +4348,7 @@
             </a:r>
             <a:r>
               <a:rPr lang="en-US" dirty="0"/>
-              <a:t> and object detection systems like SSD and Faster R-CNN.</a:t>
+              <a:t>. Image recognition on constrained devices now common.</a:t>
             </a:r>
           </a:p>
           <a:p>
@@ -4554,26 +4451,14 @@
           </a:p>
           <a:p>
             <a:r>
-              <a:rPr lang="en-US" dirty="0" err="1"/>
-              <a:t>Szegedy’s</a:t>
-            </a:r>
-            <a:r>
-              <a:rPr lang="en-US" dirty="0"/>
-              <a:t> Inception architecture improved efficiency while increasing model depth.</a:t>
-            </a:r>
-          </a:p>
-          <a:p>
-            <a:r>
-              <a:rPr lang="en-US" dirty="0"/>
-              <a:t>Objective: Replicate </a:t>
-            </a:r>
-            <a:r>
-              <a:rPr lang="en-US" dirty="0" err="1"/>
-              <a:t>GoogLeNet</a:t>
-            </a:r>
-            <a:r>
-              <a:rPr lang="en-US" dirty="0"/>
-              <a:t> using TensorFlow and test its performance on alternative datasets.</a:t>
+              <a:rPr lang="en-US" dirty="0"/>
+              <a:t>Szegedy’s Inception architecture improved efficiency while increasing model depth.</a:t>
+            </a:r>
+          </a:p>
+          <a:p>
+            <a:r>
+              <a:rPr lang="en-US" dirty="0"/>
+              <a:t>Objective: Replicate GoogLeNet using TensorFlow and test its performance on alternative datasets.</a:t>
             </a:r>
           </a:p>
         </p:txBody>
@@ -4665,12 +4550,8 @@
           <a:p>
             <a:pPr lvl="1"/>
             <a:r>
-              <a:rPr lang="en-US" dirty="0" err="1"/>
-              <a:t>Szegedy</a:t>
-            </a:r>
-            <a:r>
-              <a:rPr lang="en-US" dirty="0"/>
-              <a:t> used the full dataset; my project used a subset of 14,738 images mapped to CIFAR-10 classes.</a:t>
+              <a:rPr lang="en-US" dirty="0"/>
+              <a:t>Szegedy used the full dataset; my project used a subset of 14,738 images mapped to CIFAR-10 classes.</a:t>
             </a:r>
           </a:p>
           <a:p>
@@ -4789,15 +4670,7 @@
           <a:p>
             <a:r>
               <a:rPr lang="en-US" dirty="0"/>
-              <a:t>Depth: 22 layers in </a:t>
-            </a:r>
-            <a:r>
-              <a:rPr lang="en-US" dirty="0" err="1"/>
-              <a:t>GoogLeNet</a:t>
-            </a:r>
-            <a:r>
-              <a:rPr lang="en-US" dirty="0"/>
-              <a:t>.</a:t>
+              <a:t>Depth: 22 layers in GoogLeNet.</a:t>
             </a:r>
           </a:p>
           <a:p>
@@ -4905,12 +4778,8 @@
           <a:lstStyle/>
           <a:p>
             <a:r>
-              <a:rPr lang="en-US" dirty="0" err="1"/>
-              <a:t>GoogLeNet</a:t>
-            </a:r>
-            <a:r>
-              <a:rPr lang="en-US" dirty="0"/>
-              <a:t> Architecture</a:t>
+              <a:rPr lang="en-US" dirty="0"/>
+              <a:t>GoogLeNet Architecture</a:t>
             </a:r>
           </a:p>
         </p:txBody>
@@ -5147,15 +5016,7 @@
             <a:pPr lvl="1"/>
             <a:r>
               <a:rPr lang="en-US" dirty="0"/>
-              <a:t>Trained for comparison against </a:t>
-            </a:r>
-            <a:r>
-              <a:rPr lang="en-US" dirty="0" err="1"/>
-              <a:t>GoogLeNet</a:t>
-            </a:r>
-            <a:r>
-              <a:rPr lang="en-US" dirty="0"/>
-              <a:t>.</a:t>
+              <a:t>Trained for comparison against GoogLeNet.</a:t>
             </a:r>
           </a:p>
         </p:txBody>
@@ -5329,29 +5190,13 @@
           <a:p>
             <a:r>
               <a:rPr lang="en-US" dirty="0"/>
-              <a:t>ImageNet subset results: Simple model accuracy 58.1%, </a:t>
-            </a:r>
-            <a:r>
-              <a:rPr lang="en-US" dirty="0" err="1"/>
-              <a:t>GoogLeNet</a:t>
-            </a:r>
-            <a:r>
-              <a:rPr lang="en-US" dirty="0"/>
-              <a:t> reproduction 66.2%.</a:t>
-            </a:r>
-          </a:p>
-          <a:p>
-            <a:r>
-              <a:rPr lang="en-US" dirty="0"/>
-              <a:t>CIFAR-10 results: Simple model 21.4%, </a:t>
-            </a:r>
-            <a:r>
-              <a:rPr lang="en-US" dirty="0" err="1"/>
-              <a:t>GoogLeNet</a:t>
-            </a:r>
-            <a:r>
-              <a:rPr lang="en-US" dirty="0"/>
-              <a:t> reproduction 22.6%.</a:t>
+              <a:t>ImageNet subset results: Simple model accuracy 58.1%, GoogLeNet reproduction 66.2%.</a:t>
+            </a:r>
+          </a:p>
+          <a:p>
+            <a:r>
+              <a:rPr lang="en-US" dirty="0"/>
+              <a:t>CIFAR-10 results: Simple model 21.4%, GoogLeNet reproduction 22.6%.</a:t>
             </a:r>
           </a:p>
           <a:p>

</xml_diff>